<commit_message>
Report work and poster
</commit_message>
<xml_diff>
--- a/Poster/Poster.pptx
+++ b/Poster/Poster.pptx
@@ -107,13 +107,18 @@
       </a:defRPr>
     </a:lvl9pPr>
   </p:defaultTextStyle>
+  <p:extLst>
+    <p:ext uri="{EFAFB233-063F-42B5-8137-9DF3F51BA10A}">
+      <p15:sldGuideLst xmlns:p15="http://schemas.microsoft.com/office/powerpoint/2012/main"/>
+    </p:ext>
+  </p:extLst>
 </p:presentation>
 </file>
 
 <file path=ppt/revisionInfo.xml><?xml version="1.0" encoding="utf-8"?>
 <p1510:revInfo xmlns:a="http://schemas.openxmlformats.org/drawingml/2006/main" xmlns:r="http://schemas.openxmlformats.org/officeDocument/2006/relationships" xmlns:p1510="http://schemas.microsoft.com/office/powerpoint/2015/10/main">
   <p1510:revLst>
-    <p1510:client id="{6EFBB1F6-4657-4CEC-B12D-23333E8CDA10}" v="8" dt="2025-05-09T18:32:11.979"/>
+    <p1510:client id="{6EFBB1F6-4657-4CEC-B12D-23333E8CDA10}" v="154" dt="2025-05-10T14:27:15.876"/>
   </p1510:revLst>
 </p1510:revInfo>
 </file>
@@ -122,13 +127,13 @@
 <pc:chgInfo xmlns:a="http://schemas.openxmlformats.org/drawingml/2006/main" xmlns:r="http://schemas.openxmlformats.org/officeDocument/2006/relationships" xmlns:ac="http://schemas.microsoft.com/office/drawing/2013/main/command" xmlns:pc="http://schemas.microsoft.com/office/powerpoint/2013/main/command">
   <pc:docChgLst>
     <pc:chgData name="Samuel Aldous" userId="0ff3eb4db5f3e0fd" providerId="LiveId" clId="{6EFBB1F6-4657-4CEC-B12D-23333E8CDA10}"/>
-    <pc:docChg chg="custSel addSld modSld">
-      <pc:chgData name="Samuel Aldous" userId="0ff3eb4db5f3e0fd" providerId="LiveId" clId="{6EFBB1F6-4657-4CEC-B12D-23333E8CDA10}" dt="2025-05-09T18:32:48.402" v="500" actId="14100"/>
+    <pc:docChg chg="undo custSel addSld modSld">
+      <pc:chgData name="Samuel Aldous" userId="0ff3eb4db5f3e0fd" providerId="LiveId" clId="{6EFBB1F6-4657-4CEC-B12D-23333E8CDA10}" dt="2025-05-10T14:36:07.661" v="1597" actId="1076"/>
       <pc:docMkLst>
         <pc:docMk/>
       </pc:docMkLst>
-      <pc:sldChg chg="addSp delSp modSp new mod">
-        <pc:chgData name="Samuel Aldous" userId="0ff3eb4db5f3e0fd" providerId="LiveId" clId="{6EFBB1F6-4657-4CEC-B12D-23333E8CDA10}" dt="2025-05-09T18:32:48.402" v="500" actId="14100"/>
+      <pc:sldChg chg="addSp delSp modSp new mod setBg">
+        <pc:chgData name="Samuel Aldous" userId="0ff3eb4db5f3e0fd" providerId="LiveId" clId="{6EFBB1F6-4657-4CEC-B12D-23333E8CDA10}" dt="2025-05-10T14:36:07.661" v="1597" actId="1076"/>
         <pc:sldMkLst>
           <pc:docMk/>
           <pc:sldMk cId="3190873669" sldId="256"/>
@@ -141,6 +146,14 @@
             <ac:spMk id="2" creationId="{3390F2EE-6AE2-D8AC-0DA0-F51D4A5FB2B1}"/>
           </ac:spMkLst>
         </pc:spChg>
+        <pc:spChg chg="add del mod ord">
+          <ac:chgData name="Samuel Aldous" userId="0ff3eb4db5f3e0fd" providerId="LiveId" clId="{6EFBB1F6-4657-4CEC-B12D-23333E8CDA10}" dt="2025-05-10T11:51:38.292" v="548" actId="478"/>
+          <ac:spMkLst>
+            <pc:docMk/>
+            <pc:sldMk cId="3190873669" sldId="256"/>
+            <ac:spMk id="2" creationId="{5123CDFC-8975-54BF-28DA-6FDC1D972676}"/>
+          </ac:spMkLst>
+        </pc:spChg>
         <pc:spChg chg="del">
           <ac:chgData name="Samuel Aldous" userId="0ff3eb4db5f3e0fd" providerId="LiveId" clId="{6EFBB1F6-4657-4CEC-B12D-23333E8CDA10}" dt="2025-05-09T18:09:14.146" v="2" actId="478"/>
           <ac:spMkLst>
@@ -149,8 +162,16 @@
             <ac:spMk id="3" creationId="{6593F312-99F3-E385-8DF3-A7C247E86769}"/>
           </ac:spMkLst>
         </pc:spChg>
+        <pc:spChg chg="add del">
+          <ac:chgData name="Samuel Aldous" userId="0ff3eb4db5f3e0fd" providerId="LiveId" clId="{6EFBB1F6-4657-4CEC-B12D-23333E8CDA10}" dt="2025-05-10T11:51:49.285" v="550" actId="478"/>
+          <ac:spMkLst>
+            <pc:docMk/>
+            <pc:sldMk cId="3190873669" sldId="256"/>
+            <ac:spMk id="3" creationId="{BB734316-B0C6-7F66-75B1-A32F6FE07654}"/>
+          </ac:spMkLst>
+        </pc:spChg>
         <pc:spChg chg="add mod">
-          <ac:chgData name="Samuel Aldous" userId="0ff3eb4db5f3e0fd" providerId="LiveId" clId="{6EFBB1F6-4657-4CEC-B12D-23333E8CDA10}" dt="2025-05-09T18:29:15.237" v="185" actId="404"/>
+          <ac:chgData name="Samuel Aldous" userId="0ff3eb4db5f3e0fd" providerId="LiveId" clId="{6EFBB1F6-4657-4CEC-B12D-23333E8CDA10}" dt="2025-05-10T11:48:42.645" v="525" actId="2711"/>
           <ac:spMkLst>
             <pc:docMk/>
             <pc:sldMk cId="3190873669" sldId="256"/>
@@ -158,7 +179,7 @@
           </ac:spMkLst>
         </pc:spChg>
         <pc:spChg chg="add mod">
-          <ac:chgData name="Samuel Aldous" userId="0ff3eb4db5f3e0fd" providerId="LiveId" clId="{6EFBB1F6-4657-4CEC-B12D-23333E8CDA10}" dt="2025-05-09T18:30:25.847" v="238" actId="14100"/>
+          <ac:chgData name="Samuel Aldous" userId="0ff3eb4db5f3e0fd" providerId="LiveId" clId="{6EFBB1F6-4657-4CEC-B12D-23333E8CDA10}" dt="2025-05-10T14:15:40.693" v="1419" actId="1076"/>
           <ac:spMkLst>
             <pc:docMk/>
             <pc:sldMk cId="3190873669" sldId="256"/>
@@ -166,7 +187,7 @@
           </ac:spMkLst>
         </pc:spChg>
         <pc:spChg chg="add mod">
-          <ac:chgData name="Samuel Aldous" userId="0ff3eb4db5f3e0fd" providerId="LiveId" clId="{6EFBB1F6-4657-4CEC-B12D-23333E8CDA10}" dt="2025-05-09T18:31:15.552" v="371" actId="1038"/>
+          <ac:chgData name="Samuel Aldous" userId="0ff3eb4db5f3e0fd" providerId="LiveId" clId="{6EFBB1F6-4657-4CEC-B12D-23333E8CDA10}" dt="2025-05-10T14:36:07.661" v="1597" actId="1076"/>
           <ac:spMkLst>
             <pc:docMk/>
             <pc:sldMk cId="3190873669" sldId="256"/>
@@ -174,15 +195,15 @@
           </ac:spMkLst>
         </pc:spChg>
         <pc:spChg chg="add mod">
-          <ac:chgData name="Samuel Aldous" userId="0ff3eb4db5f3e0fd" providerId="LiveId" clId="{6EFBB1F6-4657-4CEC-B12D-23333E8CDA10}" dt="2025-05-09T18:31:18.728" v="375" actId="1037"/>
+          <ac:chgData name="Samuel Aldous" userId="0ff3eb4db5f3e0fd" providerId="LiveId" clId="{6EFBB1F6-4657-4CEC-B12D-23333E8CDA10}" dt="2025-05-10T11:56:38.247" v="759" actId="1076"/>
           <ac:spMkLst>
             <pc:docMk/>
             <pc:sldMk cId="3190873669" sldId="256"/>
             <ac:spMk id="7" creationId="{CC990FB7-E046-AC0C-598F-41E04D8AAEC2}"/>
           </ac:spMkLst>
         </pc:spChg>
-        <pc:spChg chg="add mod">
-          <ac:chgData name="Samuel Aldous" userId="0ff3eb4db5f3e0fd" providerId="LiveId" clId="{6EFBB1F6-4657-4CEC-B12D-23333E8CDA10}" dt="2025-05-09T18:31:53.603" v="412" actId="20577"/>
+        <pc:spChg chg="add del mod">
+          <ac:chgData name="Samuel Aldous" userId="0ff3eb4db5f3e0fd" providerId="LiveId" clId="{6EFBB1F6-4657-4CEC-B12D-23333E8CDA10}" dt="2025-05-10T12:36:18.673" v="841" actId="478"/>
           <ac:spMkLst>
             <pc:docMk/>
             <pc:sldMk cId="3190873669" sldId="256"/>
@@ -190,7 +211,7 @@
           </ac:spMkLst>
         </pc:spChg>
         <pc:spChg chg="add mod">
-          <ac:chgData name="Samuel Aldous" userId="0ff3eb4db5f3e0fd" providerId="LiveId" clId="{6EFBB1F6-4657-4CEC-B12D-23333E8CDA10}" dt="2025-05-09T18:32:10.459" v="441" actId="1076"/>
+          <ac:chgData name="Samuel Aldous" userId="0ff3eb4db5f3e0fd" providerId="LiveId" clId="{6EFBB1F6-4657-4CEC-B12D-23333E8CDA10}" dt="2025-05-10T14:35:33.832" v="1593" actId="1076"/>
           <ac:spMkLst>
             <pc:docMk/>
             <pc:sldMk cId="3190873669" sldId="256"/>
@@ -198,13 +219,325 @@
           </ac:spMkLst>
         </pc:spChg>
         <pc:spChg chg="add mod">
-          <ac:chgData name="Samuel Aldous" userId="0ff3eb4db5f3e0fd" providerId="LiveId" clId="{6EFBB1F6-4657-4CEC-B12D-23333E8CDA10}" dt="2025-05-09T18:32:48.402" v="500" actId="14100"/>
+          <ac:chgData name="Samuel Aldous" userId="0ff3eb4db5f3e0fd" providerId="LiveId" clId="{6EFBB1F6-4657-4CEC-B12D-23333E8CDA10}" dt="2025-05-10T14:31:50.281" v="1559" actId="1076"/>
           <ac:spMkLst>
             <pc:docMk/>
             <pc:sldMk cId="3190873669" sldId="256"/>
             <ac:spMk id="10" creationId="{2D675A74-62CE-A7CB-9D9B-CF63E90A9C7F}"/>
           </ac:spMkLst>
         </pc:spChg>
+        <pc:spChg chg="add del">
+          <ac:chgData name="Samuel Aldous" userId="0ff3eb4db5f3e0fd" providerId="LiveId" clId="{6EFBB1F6-4657-4CEC-B12D-23333E8CDA10}" dt="2025-05-10T11:51:59.637" v="552" actId="478"/>
+          <ac:spMkLst>
+            <pc:docMk/>
+            <pc:sldMk cId="3190873669" sldId="256"/>
+            <ac:spMk id="11" creationId="{A7068D47-B40C-A6DF-F327-EBF94516A5B7}"/>
+          </ac:spMkLst>
+        </pc:spChg>
+        <pc:spChg chg="add del mod">
+          <ac:chgData name="Samuel Aldous" userId="0ff3eb4db5f3e0fd" providerId="LiveId" clId="{6EFBB1F6-4657-4CEC-B12D-23333E8CDA10}" dt="2025-05-10T11:53:42.401" v="749" actId="478"/>
+          <ac:spMkLst>
+            <pc:docMk/>
+            <pc:sldMk cId="3190873669" sldId="256"/>
+            <ac:spMk id="12" creationId="{DE3A9A5F-6EB5-0E0A-B6F2-EFFA5C92FFA9}"/>
+          </ac:spMkLst>
+        </pc:spChg>
+        <pc:spChg chg="add del">
+          <ac:chgData name="Samuel Aldous" userId="0ff3eb4db5f3e0fd" providerId="LiveId" clId="{6EFBB1F6-4657-4CEC-B12D-23333E8CDA10}" dt="2025-05-10T11:54:08.820" v="751" actId="478"/>
+          <ac:spMkLst>
+            <pc:docMk/>
+            <pc:sldMk cId="3190873669" sldId="256"/>
+            <ac:spMk id="13" creationId="{00F3D4BD-23F2-E45C-8CD9-AE1F49C912B6}"/>
+          </ac:spMkLst>
+        </pc:spChg>
+        <pc:spChg chg="add del mod">
+          <ac:chgData name="Samuel Aldous" userId="0ff3eb4db5f3e0fd" providerId="LiveId" clId="{6EFBB1F6-4657-4CEC-B12D-23333E8CDA10}" dt="2025-05-10T11:54:33.223" v="756" actId="478"/>
+          <ac:spMkLst>
+            <pc:docMk/>
+            <pc:sldMk cId="3190873669" sldId="256"/>
+            <ac:spMk id="14" creationId="{1808B182-19C7-F529-66D8-241D832C7187}"/>
+          </ac:spMkLst>
+        </pc:spChg>
+        <pc:spChg chg="add del">
+          <ac:chgData name="Samuel Aldous" userId="0ff3eb4db5f3e0fd" providerId="LiveId" clId="{6EFBB1F6-4657-4CEC-B12D-23333E8CDA10}" dt="2025-05-10T11:54:44.589" v="758" actId="478"/>
+          <ac:spMkLst>
+            <pc:docMk/>
+            <pc:sldMk cId="3190873669" sldId="256"/>
+            <ac:spMk id="15" creationId="{F23105F7-3F9F-7484-261C-92C04D82D44D}"/>
+          </ac:spMkLst>
+        </pc:spChg>
+        <pc:spChg chg="add del mod">
+          <ac:chgData name="Samuel Aldous" userId="0ff3eb4db5f3e0fd" providerId="LiveId" clId="{6EFBB1F6-4657-4CEC-B12D-23333E8CDA10}" dt="2025-05-10T11:57:14.357" v="770"/>
+          <ac:spMkLst>
+            <pc:docMk/>
+            <pc:sldMk cId="3190873669" sldId="256"/>
+            <ac:spMk id="16" creationId="{B3D27FA2-0880-4669-91A0-8AE319DA730B}"/>
+          </ac:spMkLst>
+        </pc:spChg>
+        <pc:spChg chg="add del mod">
+          <ac:chgData name="Samuel Aldous" userId="0ff3eb4db5f3e0fd" providerId="LiveId" clId="{6EFBB1F6-4657-4CEC-B12D-23333E8CDA10}" dt="2025-05-10T11:57:29.932" v="796" actId="478"/>
+          <ac:spMkLst>
+            <pc:docMk/>
+            <pc:sldMk cId="3190873669" sldId="256"/>
+            <ac:spMk id="17" creationId="{445A16A7-7A54-ED6C-32BA-F9456138694A}"/>
+          </ac:spMkLst>
+        </pc:spChg>
+        <pc:spChg chg="add mod">
+          <ac:chgData name="Samuel Aldous" userId="0ff3eb4db5f3e0fd" providerId="LiveId" clId="{6EFBB1F6-4657-4CEC-B12D-23333E8CDA10}" dt="2025-05-10T12:00:41.086" v="816" actId="20577"/>
+          <ac:spMkLst>
+            <pc:docMk/>
+            <pc:sldMk cId="3190873669" sldId="256"/>
+            <ac:spMk id="18" creationId="{6BFA8D6F-2973-0B7A-7367-A2E7DB16C973}"/>
+          </ac:spMkLst>
+        </pc:spChg>
+        <pc:spChg chg="add del mod">
+          <ac:chgData name="Samuel Aldous" userId="0ff3eb4db5f3e0fd" providerId="LiveId" clId="{6EFBB1F6-4657-4CEC-B12D-23333E8CDA10}" dt="2025-05-10T12:37:45.241" v="855" actId="478"/>
+          <ac:spMkLst>
+            <pc:docMk/>
+            <pc:sldMk cId="3190873669" sldId="256"/>
+            <ac:spMk id="19" creationId="{F7129E73-F4B3-F54C-AC73-6A96EFBE7103}"/>
+          </ac:spMkLst>
+        </pc:spChg>
+        <pc:spChg chg="add del mod ord">
+          <ac:chgData name="Samuel Aldous" userId="0ff3eb4db5f3e0fd" providerId="LiveId" clId="{6EFBB1F6-4657-4CEC-B12D-23333E8CDA10}" dt="2025-05-10T12:38:47.231" v="859" actId="478"/>
+          <ac:spMkLst>
+            <pc:docMk/>
+            <pc:sldMk cId="3190873669" sldId="256"/>
+            <ac:spMk id="20" creationId="{F7366EBC-2347-09F4-34F6-12620899A481}"/>
+          </ac:spMkLst>
+        </pc:spChg>
+        <pc:spChg chg="add mod">
+          <ac:chgData name="Samuel Aldous" userId="0ff3eb4db5f3e0fd" providerId="LiveId" clId="{6EFBB1F6-4657-4CEC-B12D-23333E8CDA10}" dt="2025-05-10T12:40:19.182" v="895" actId="20577"/>
+          <ac:spMkLst>
+            <pc:docMk/>
+            <pc:sldMk cId="3190873669" sldId="256"/>
+            <ac:spMk id="21" creationId="{3F5EABF8-11F5-6CEA-6DE9-28FF64AE3804}"/>
+          </ac:spMkLst>
+        </pc:spChg>
+        <pc:spChg chg="add mod">
+          <ac:chgData name="Samuel Aldous" userId="0ff3eb4db5f3e0fd" providerId="LiveId" clId="{6EFBB1F6-4657-4CEC-B12D-23333E8CDA10}" dt="2025-05-10T14:21:28.783" v="1511" actId="2711"/>
+          <ac:spMkLst>
+            <pc:docMk/>
+            <pc:sldMk cId="3190873669" sldId="256"/>
+            <ac:spMk id="25" creationId="{ADB1CD0C-04F2-2D54-CD5E-45E27DF591AB}"/>
+          </ac:spMkLst>
+        </pc:spChg>
+        <pc:spChg chg="add del mod">
+          <ac:chgData name="Samuel Aldous" userId="0ff3eb4db5f3e0fd" providerId="LiveId" clId="{6EFBB1F6-4657-4CEC-B12D-23333E8CDA10}" dt="2025-05-10T12:51:15.939" v="1052" actId="478"/>
+          <ac:spMkLst>
+            <pc:docMk/>
+            <pc:sldMk cId="3190873669" sldId="256"/>
+            <ac:spMk id="26" creationId="{EE98D9D3-B7F7-AEEF-41A8-758738F3D3BF}"/>
+          </ac:spMkLst>
+        </pc:spChg>
+        <pc:spChg chg="add mod">
+          <ac:chgData name="Samuel Aldous" userId="0ff3eb4db5f3e0fd" providerId="LiveId" clId="{6EFBB1F6-4657-4CEC-B12D-23333E8CDA10}" dt="2025-05-10T14:13:48.544" v="1416" actId="1076"/>
+          <ac:spMkLst>
+            <pc:docMk/>
+            <pc:sldMk cId="3190873669" sldId="256"/>
+            <ac:spMk id="37" creationId="{B3EC80CA-1AED-25AA-8603-9D7B098BFBF1}"/>
+          </ac:spMkLst>
+        </pc:spChg>
+        <pc:spChg chg="add mod">
+          <ac:chgData name="Samuel Aldous" userId="0ff3eb4db5f3e0fd" providerId="LiveId" clId="{6EFBB1F6-4657-4CEC-B12D-23333E8CDA10}" dt="2025-05-10T14:13:48.544" v="1416" actId="1076"/>
+          <ac:spMkLst>
+            <pc:docMk/>
+            <pc:sldMk cId="3190873669" sldId="256"/>
+            <ac:spMk id="48" creationId="{66FB707F-58FB-0524-C428-733BBAB0E15D}"/>
+          </ac:spMkLst>
+        </pc:spChg>
+        <pc:spChg chg="add mod ord">
+          <ac:chgData name="Samuel Aldous" userId="0ff3eb4db5f3e0fd" providerId="LiveId" clId="{6EFBB1F6-4657-4CEC-B12D-23333E8CDA10}" dt="2025-05-10T14:34:05.253" v="1571" actId="166"/>
+          <ac:spMkLst>
+            <pc:docMk/>
+            <pc:sldMk cId="3190873669" sldId="256"/>
+            <ac:spMk id="49" creationId="{0872C768-8D38-1919-9E2E-CCAF17AD9A3B}"/>
+          </ac:spMkLst>
+        </pc:spChg>
+        <pc:spChg chg="add mod">
+          <ac:chgData name="Samuel Aldous" userId="0ff3eb4db5f3e0fd" providerId="LiveId" clId="{6EFBB1F6-4657-4CEC-B12D-23333E8CDA10}" dt="2025-05-10T14:13:48.544" v="1416" actId="1076"/>
+          <ac:spMkLst>
+            <pc:docMk/>
+            <pc:sldMk cId="3190873669" sldId="256"/>
+            <ac:spMk id="50" creationId="{61A9A262-822D-9023-50B6-1D9E6811B6C3}"/>
+          </ac:spMkLst>
+        </pc:spChg>
+        <pc:spChg chg="add mod">
+          <ac:chgData name="Samuel Aldous" userId="0ff3eb4db5f3e0fd" providerId="LiveId" clId="{6EFBB1F6-4657-4CEC-B12D-23333E8CDA10}" dt="2025-05-10T14:13:48.544" v="1416" actId="1076"/>
+          <ac:spMkLst>
+            <pc:docMk/>
+            <pc:sldMk cId="3190873669" sldId="256"/>
+            <ac:spMk id="52" creationId="{73EA6F9E-09D4-5A25-D81F-78DC07F701BD}"/>
+          </ac:spMkLst>
+        </pc:spChg>
+        <pc:spChg chg="add mod">
+          <ac:chgData name="Samuel Aldous" userId="0ff3eb4db5f3e0fd" providerId="LiveId" clId="{6EFBB1F6-4657-4CEC-B12D-23333E8CDA10}" dt="2025-05-10T14:13:48.544" v="1416" actId="1076"/>
+          <ac:spMkLst>
+            <pc:docMk/>
+            <pc:sldMk cId="3190873669" sldId="256"/>
+            <ac:spMk id="53" creationId="{E28AE61A-D7CC-5CCC-A898-CBC3BB5B6361}"/>
+          </ac:spMkLst>
+        </pc:spChg>
+        <pc:spChg chg="add del mod">
+          <ac:chgData name="Samuel Aldous" userId="0ff3eb4db5f3e0fd" providerId="LiveId" clId="{6EFBB1F6-4657-4CEC-B12D-23333E8CDA10}" dt="2025-05-10T12:56:45.721" v="1348" actId="478"/>
+          <ac:spMkLst>
+            <pc:docMk/>
+            <pc:sldMk cId="3190873669" sldId="256"/>
+            <ac:spMk id="55" creationId="{8E488A05-3E00-5E2B-AF50-355843DC991B}"/>
+          </ac:spMkLst>
+        </pc:spChg>
+        <pc:spChg chg="add mod">
+          <ac:chgData name="Samuel Aldous" userId="0ff3eb4db5f3e0fd" providerId="LiveId" clId="{6EFBB1F6-4657-4CEC-B12D-23333E8CDA10}" dt="2025-05-10T14:22:41.273" v="1515" actId="2711"/>
+          <ac:spMkLst>
+            <pc:docMk/>
+            <pc:sldMk cId="3190873669" sldId="256"/>
+            <ac:spMk id="57" creationId="{ACB41813-D9CB-C70A-69F0-42AA552540E8}"/>
+          </ac:spMkLst>
+        </pc:spChg>
+        <pc:spChg chg="add del mod">
+          <ac:chgData name="Samuel Aldous" userId="0ff3eb4db5f3e0fd" providerId="LiveId" clId="{6EFBB1F6-4657-4CEC-B12D-23333E8CDA10}" dt="2025-05-10T14:17:10.086" v="1429" actId="478"/>
+          <ac:spMkLst>
+            <pc:docMk/>
+            <pc:sldMk cId="3190873669" sldId="256"/>
+            <ac:spMk id="1030" creationId="{478CCDC2-9218-FCC6-9884-3CE830AEA111}"/>
+          </ac:spMkLst>
+        </pc:spChg>
+        <pc:spChg chg="add mod">
+          <ac:chgData name="Samuel Aldous" userId="0ff3eb4db5f3e0fd" providerId="LiveId" clId="{6EFBB1F6-4657-4CEC-B12D-23333E8CDA10}" dt="2025-05-10T14:20:29.362" v="1508" actId="1035"/>
+          <ac:spMkLst>
+            <pc:docMk/>
+            <pc:sldMk cId="3190873669" sldId="256"/>
+            <ac:spMk id="1031" creationId="{7C9DCCCE-FBC3-236D-A813-30BBE9BD287A}"/>
+          </ac:spMkLst>
+        </pc:spChg>
+        <pc:spChg chg="add mod">
+          <ac:chgData name="Samuel Aldous" userId="0ff3eb4db5f3e0fd" providerId="LiveId" clId="{6EFBB1F6-4657-4CEC-B12D-23333E8CDA10}" dt="2025-05-10T14:20:42.068" v="1509" actId="1076"/>
+          <ac:spMkLst>
+            <pc:docMk/>
+            <pc:sldMk cId="3190873669" sldId="256"/>
+            <ac:spMk id="1032" creationId="{74943ED8-77B4-AD87-4BED-DA8C1A4ADC0A}"/>
+          </ac:spMkLst>
+        </pc:spChg>
+        <pc:spChg chg="add del mod ord">
+          <ac:chgData name="Samuel Aldous" userId="0ff3eb4db5f3e0fd" providerId="LiveId" clId="{6EFBB1F6-4657-4CEC-B12D-23333E8CDA10}" dt="2025-05-10T14:36:00.692" v="1596" actId="478"/>
+          <ac:spMkLst>
+            <pc:docMk/>
+            <pc:sldMk cId="3190873669" sldId="256"/>
+            <ac:spMk id="1035" creationId="{551CC4B5-2B0D-D5EA-BBED-60C52963ED1E}"/>
+          </ac:spMkLst>
+        </pc:spChg>
+        <pc:graphicFrameChg chg="add del mod modGraphic">
+          <ac:chgData name="Samuel Aldous" userId="0ff3eb4db5f3e0fd" providerId="LiveId" clId="{6EFBB1F6-4657-4CEC-B12D-23333E8CDA10}" dt="2025-05-10T12:50:05.190" v="1000" actId="478"/>
+          <ac:graphicFrameMkLst>
+            <pc:docMk/>
+            <pc:sldMk cId="3190873669" sldId="256"/>
+            <ac:graphicFrameMk id="24" creationId="{D4D30E36-6519-A7A4-8A7D-06E3F7B2B3D3}"/>
+          </ac:graphicFrameMkLst>
+        </pc:graphicFrameChg>
+        <pc:picChg chg="add del mod modCrop">
+          <ac:chgData name="Samuel Aldous" userId="0ff3eb4db5f3e0fd" providerId="LiveId" clId="{6EFBB1F6-4657-4CEC-B12D-23333E8CDA10}" dt="2025-05-10T12:45:20.409" v="915" actId="478"/>
+          <ac:picMkLst>
+            <pc:docMk/>
+            <pc:sldMk cId="3190873669" sldId="256"/>
+            <ac:picMk id="23" creationId="{D8E86E4F-98E1-84BE-91D6-15D060BBC61F}"/>
+          </ac:picMkLst>
+        </pc:picChg>
+        <pc:picChg chg="add del mod">
+          <ac:chgData name="Samuel Aldous" userId="0ff3eb4db5f3e0fd" providerId="LiveId" clId="{6EFBB1F6-4657-4CEC-B12D-23333E8CDA10}" dt="2025-05-10T12:36:18.673" v="841" actId="478"/>
+          <ac:picMkLst>
+            <pc:docMk/>
+            <pc:sldMk cId="3190873669" sldId="256"/>
+            <ac:picMk id="1026" creationId="{318E5796-45E8-297C-8FE6-F86CA8854F93}"/>
+          </ac:picMkLst>
+        </pc:picChg>
+        <pc:picChg chg="add mod ord modCrop">
+          <ac:chgData name="Samuel Aldous" userId="0ff3eb4db5f3e0fd" providerId="LiveId" clId="{6EFBB1F6-4657-4CEC-B12D-23333E8CDA10}" dt="2025-05-10T14:35:38.766" v="1594" actId="14100"/>
+          <ac:picMkLst>
+            <pc:docMk/>
+            <pc:sldMk cId="3190873669" sldId="256"/>
+            <ac:picMk id="1034" creationId="{7FCCDD8C-13E4-8B97-EEA0-64D9C29E3950}"/>
+          </ac:picMkLst>
+        </pc:picChg>
+        <pc:cxnChg chg="add del mod">
+          <ac:chgData name="Samuel Aldous" userId="0ff3eb4db5f3e0fd" providerId="LiveId" clId="{6EFBB1F6-4657-4CEC-B12D-23333E8CDA10}" dt="2025-05-10T12:51:28.191" v="1055" actId="478"/>
+          <ac:cxnSpMkLst>
+            <pc:docMk/>
+            <pc:sldMk cId="3190873669" sldId="256"/>
+            <ac:cxnSpMk id="28" creationId="{9C721F39-6015-581B-1106-F0D7C9B8A725}"/>
+          </ac:cxnSpMkLst>
+        </pc:cxnChg>
+        <pc:cxnChg chg="add del">
+          <ac:chgData name="Samuel Aldous" userId="0ff3eb4db5f3e0fd" providerId="LiveId" clId="{6EFBB1F6-4657-4CEC-B12D-23333E8CDA10}" dt="2025-05-10T12:51:44.197" v="1057" actId="478"/>
+          <ac:cxnSpMkLst>
+            <pc:docMk/>
+            <pc:sldMk cId="3190873669" sldId="256"/>
+            <ac:cxnSpMk id="31" creationId="{F1D21BB8-3792-1F7E-F957-FED6E727C031}"/>
+          </ac:cxnSpMkLst>
+        </pc:cxnChg>
+        <pc:cxnChg chg="add mod">
+          <ac:chgData name="Samuel Aldous" userId="0ff3eb4db5f3e0fd" providerId="LiveId" clId="{6EFBB1F6-4657-4CEC-B12D-23333E8CDA10}" dt="2025-05-10T12:53:57.294" v="1187" actId="1038"/>
+          <ac:cxnSpMkLst>
+            <pc:docMk/>
+            <pc:sldMk cId="3190873669" sldId="256"/>
+            <ac:cxnSpMk id="33" creationId="{D3C79E24-4338-2ECF-9CD4-DE904FE4B9DC}"/>
+          </ac:cxnSpMkLst>
+        </pc:cxnChg>
+        <pc:cxnChg chg="add mod">
+          <ac:chgData name="Samuel Aldous" userId="0ff3eb4db5f3e0fd" providerId="LiveId" clId="{6EFBB1F6-4657-4CEC-B12D-23333E8CDA10}" dt="2025-05-10T14:13:31.777" v="1414" actId="14100"/>
+          <ac:cxnSpMkLst>
+            <pc:docMk/>
+            <pc:sldMk cId="3190873669" sldId="256"/>
+            <ac:cxnSpMk id="38" creationId="{C2F4A1F2-C034-A86B-E069-0269A2702FA4}"/>
+          </ac:cxnSpMkLst>
+        </pc:cxnChg>
+        <pc:cxnChg chg="add mod">
+          <ac:chgData name="Samuel Aldous" userId="0ff3eb4db5f3e0fd" providerId="LiveId" clId="{6EFBB1F6-4657-4CEC-B12D-23333E8CDA10}" dt="2025-05-10T12:54:12.461" v="1191" actId="14100"/>
+          <ac:cxnSpMkLst>
+            <pc:docMk/>
+            <pc:sldMk cId="3190873669" sldId="256"/>
+            <ac:cxnSpMk id="40" creationId="{704EFCE8-2678-1B68-83C9-12D0BDA4A7F2}"/>
+          </ac:cxnSpMkLst>
+        </pc:cxnChg>
+        <pc:cxnChg chg="add mod ord">
+          <ac:chgData name="Samuel Aldous" userId="0ff3eb4db5f3e0fd" providerId="LiveId" clId="{6EFBB1F6-4657-4CEC-B12D-23333E8CDA10}" dt="2025-05-10T14:34:05.253" v="1571" actId="166"/>
+          <ac:cxnSpMkLst>
+            <pc:docMk/>
+            <pc:sldMk cId="3190873669" sldId="256"/>
+            <ac:cxnSpMk id="42" creationId="{2431291A-133B-FC9B-8D53-6916BE0073C9}"/>
+          </ac:cxnSpMkLst>
+        </pc:cxnChg>
+        <pc:cxnChg chg="add mod">
+          <ac:chgData name="Samuel Aldous" userId="0ff3eb4db5f3e0fd" providerId="LiveId" clId="{6EFBB1F6-4657-4CEC-B12D-23333E8CDA10}" dt="2025-05-10T14:13:48.544" v="1416" actId="1076"/>
+          <ac:cxnSpMkLst>
+            <pc:docMk/>
+            <pc:sldMk cId="3190873669" sldId="256"/>
+            <ac:cxnSpMk id="51" creationId="{BD4A5CF2-4968-172E-9EE4-BF1A37ADAAB4}"/>
+          </ac:cxnSpMkLst>
+        </pc:cxnChg>
+        <pc:cxnChg chg="add mod">
+          <ac:chgData name="Samuel Aldous" userId="0ff3eb4db5f3e0fd" providerId="LiveId" clId="{6EFBB1F6-4657-4CEC-B12D-23333E8CDA10}" dt="2025-05-10T14:13:48.544" v="1416" actId="1076"/>
+          <ac:cxnSpMkLst>
+            <pc:docMk/>
+            <pc:sldMk cId="3190873669" sldId="256"/>
+            <ac:cxnSpMk id="54" creationId="{7CCC2150-B004-0A72-74F6-553C20C1789A}"/>
+          </ac:cxnSpMkLst>
+        </pc:cxnChg>
+        <pc:cxnChg chg="add mod">
+          <ac:chgData name="Samuel Aldous" userId="0ff3eb4db5f3e0fd" providerId="LiveId" clId="{6EFBB1F6-4657-4CEC-B12D-23333E8CDA10}" dt="2025-05-10T12:56:24.815" v="1322" actId="1035"/>
+          <ac:cxnSpMkLst>
+            <pc:docMk/>
+            <pc:sldMk cId="3190873669" sldId="256"/>
+            <ac:cxnSpMk id="56" creationId="{7C3BAE51-CF8D-B7E5-9BAC-356101471CB3}"/>
+          </ac:cxnSpMkLst>
+        </pc:cxnChg>
+        <pc:cxnChg chg="add del mod">
+          <ac:chgData name="Samuel Aldous" userId="0ff3eb4db5f3e0fd" providerId="LiveId" clId="{6EFBB1F6-4657-4CEC-B12D-23333E8CDA10}" dt="2025-05-10T12:58:01.045" v="1406" actId="478"/>
+          <ac:cxnSpMkLst>
+            <pc:docMk/>
+            <pc:sldMk cId="3190873669" sldId="256"/>
+            <ac:cxnSpMk id="58" creationId="{B781B5BA-9263-C180-64D1-4C91CA93D2DC}"/>
+          </ac:cxnSpMkLst>
+        </pc:cxnChg>
       </pc:sldChg>
     </pc:docChg>
   </pc:docChgLst>
@@ -293,7 +626,7 @@
           <a:p>
             <a:fld id="{1FAB8E8F-D1CB-494B-B6E4-134378C2B7A9}" type="datetimeFigureOut">
               <a:rPr lang="en-GB" smtClean="0"/>
-              <a:t>09/05/2025</a:t>
+              <a:t>10/05/2025</a:t>
             </a:fld>
             <a:endParaRPr lang="en-GB"/>
           </a:p>
@@ -692,7 +1025,7 @@
           <a:p>
             <a:fld id="{A4D9B840-AB25-4D96-A6B6-A8B82B77049F}" type="datetimeFigureOut">
               <a:rPr lang="en-GB" smtClean="0"/>
-              <a:t>09/05/2025</a:t>
+              <a:t>10/05/2025</a:t>
             </a:fld>
             <a:endParaRPr lang="en-GB"/>
           </a:p>
@@ -862,7 +1195,7 @@
           <a:p>
             <a:fld id="{A4D9B840-AB25-4D96-A6B6-A8B82B77049F}" type="datetimeFigureOut">
               <a:rPr lang="en-GB" smtClean="0"/>
-              <a:t>09/05/2025</a:t>
+              <a:t>10/05/2025</a:t>
             </a:fld>
             <a:endParaRPr lang="en-GB"/>
           </a:p>
@@ -1042,7 +1375,7 @@
           <a:p>
             <a:fld id="{A4D9B840-AB25-4D96-A6B6-A8B82B77049F}" type="datetimeFigureOut">
               <a:rPr lang="en-GB" smtClean="0"/>
-              <a:t>09/05/2025</a:t>
+              <a:t>10/05/2025</a:t>
             </a:fld>
             <a:endParaRPr lang="en-GB"/>
           </a:p>
@@ -1212,7 +1545,7 @@
           <a:p>
             <a:fld id="{A4D9B840-AB25-4D96-A6B6-A8B82B77049F}" type="datetimeFigureOut">
               <a:rPr lang="en-GB" smtClean="0"/>
-              <a:t>09/05/2025</a:t>
+              <a:t>10/05/2025</a:t>
             </a:fld>
             <a:endParaRPr lang="en-GB"/>
           </a:p>
@@ -1458,7 +1791,7 @@
           <a:p>
             <a:fld id="{A4D9B840-AB25-4D96-A6B6-A8B82B77049F}" type="datetimeFigureOut">
               <a:rPr lang="en-GB" smtClean="0"/>
-              <a:t>09/05/2025</a:t>
+              <a:t>10/05/2025</a:t>
             </a:fld>
             <a:endParaRPr lang="en-GB"/>
           </a:p>
@@ -1690,7 +2023,7 @@
           <a:p>
             <a:fld id="{A4D9B840-AB25-4D96-A6B6-A8B82B77049F}" type="datetimeFigureOut">
               <a:rPr lang="en-GB" smtClean="0"/>
-              <a:t>09/05/2025</a:t>
+              <a:t>10/05/2025</a:t>
             </a:fld>
             <a:endParaRPr lang="en-GB"/>
           </a:p>
@@ -2057,7 +2390,7 @@
           <a:p>
             <a:fld id="{A4D9B840-AB25-4D96-A6B6-A8B82B77049F}" type="datetimeFigureOut">
               <a:rPr lang="en-GB" smtClean="0"/>
-              <a:t>09/05/2025</a:t>
+              <a:t>10/05/2025</a:t>
             </a:fld>
             <a:endParaRPr lang="en-GB"/>
           </a:p>
@@ -2175,7 +2508,7 @@
           <a:p>
             <a:fld id="{A4D9B840-AB25-4D96-A6B6-A8B82B77049F}" type="datetimeFigureOut">
               <a:rPr lang="en-GB" smtClean="0"/>
-              <a:t>09/05/2025</a:t>
+              <a:t>10/05/2025</a:t>
             </a:fld>
             <a:endParaRPr lang="en-GB"/>
           </a:p>
@@ -2270,7 +2603,7 @@
           <a:p>
             <a:fld id="{A4D9B840-AB25-4D96-A6B6-A8B82B77049F}" type="datetimeFigureOut">
               <a:rPr lang="en-GB" smtClean="0"/>
-              <a:t>09/05/2025</a:t>
+              <a:t>10/05/2025</a:t>
             </a:fld>
             <a:endParaRPr lang="en-GB"/>
           </a:p>
@@ -2547,7 +2880,7 @@
           <a:p>
             <a:fld id="{A4D9B840-AB25-4D96-A6B6-A8B82B77049F}" type="datetimeFigureOut">
               <a:rPr lang="en-GB" smtClean="0"/>
-              <a:t>09/05/2025</a:t>
+              <a:t>10/05/2025</a:t>
             </a:fld>
             <a:endParaRPr lang="en-GB"/>
           </a:p>
@@ -2804,7 +3137,7 @@
           <a:p>
             <a:fld id="{A4D9B840-AB25-4D96-A6B6-A8B82B77049F}" type="datetimeFigureOut">
               <a:rPr lang="en-GB" smtClean="0"/>
-              <a:t>09/05/2025</a:t>
+              <a:t>10/05/2025</a:t>
             </a:fld>
             <a:endParaRPr lang="en-GB"/>
           </a:p>
@@ -3017,7 +3350,7 @@
           <a:p>
             <a:fld id="{A4D9B840-AB25-4D96-A6B6-A8B82B77049F}" type="datetimeFigureOut">
               <a:rPr lang="en-GB" smtClean="0"/>
-              <a:t>09/05/2025</a:t>
+              <a:t>10/05/2025</a:t>
             </a:fld>
             <a:endParaRPr lang="en-GB"/>
           </a:p>
@@ -3408,6 +3741,14 @@
 <file path=ppt/slides/slide1.xml><?xml version="1.0" encoding="utf-8"?>
 <p:sld xmlns:a="http://schemas.openxmlformats.org/drawingml/2006/main" xmlns:r="http://schemas.openxmlformats.org/officeDocument/2006/relationships" xmlns:p="http://schemas.openxmlformats.org/presentationml/2006/main">
   <p:cSld>
+    <p:bg>
+      <p:bgPr>
+        <a:solidFill>
+          <a:schemeClr val="bg1"/>
+        </a:solidFill>
+        <a:effectLst/>
+      </p:bgPr>
+    </p:bg>
     <p:spTree>
       <p:nvGrpSpPr>
         <p:cNvPr id="1" name=""/>
@@ -3422,6 +3763,35 @@
           <a:chExt cx="0" cy="0"/>
         </a:xfrm>
       </p:grpSpPr>
+      <p:pic>
+        <p:nvPicPr>
+          <p:cNvPr id="1034" name="Picture 1033" descr="A close up of a screen&#10;&#10;AI-generated content may be incorrect.">
+            <a:extLst>
+              <a:ext uri="{FF2B5EF4-FFF2-40B4-BE49-F238E27FC236}">
+                <a16:creationId xmlns:a16="http://schemas.microsoft.com/office/drawing/2014/main" id="{7FCCDD8C-13E4-8B97-EEA0-64D9C29E3950}"/>
+              </a:ext>
+            </a:extLst>
+          </p:cNvPr>
+          <p:cNvPicPr>
+            <a:picLocks noChangeAspect="1"/>
+          </p:cNvPicPr>
+          <p:nvPr/>
+        </p:nvPicPr>
+        <p:blipFill>
+          <a:blip r:embed="rId2"/>
+          <a:srcRect l="3311" t="14884" r="50541" b="50664"/>
+          <a:stretch/>
+        </p:blipFill>
+        <p:spPr>
+          <a:xfrm>
+            <a:off x="1" y="22050480"/>
+            <a:ext cx="10750228" cy="20821798"/>
+          </a:xfrm>
+          <a:prstGeom prst="rect">
+            <a:avLst/>
+          </a:prstGeom>
+        </p:spPr>
+      </p:pic>
       <p:sp>
         <p:nvSpPr>
           <p:cNvPr id="4" name="TextBox 3">
@@ -3436,8 +3806,8 @@
         </p:nvSpPr>
         <p:spPr>
           <a:xfrm>
-            <a:off x="3472310" y="24633"/>
-            <a:ext cx="23402600" cy="2308324"/>
+            <a:off x="375966" y="30353"/>
+            <a:ext cx="29899246" cy="3046988"/>
           </a:xfrm>
           <a:prstGeom prst="rect">
             <a:avLst/>
@@ -3450,11 +3820,11 @@
           </a:bodyPr>
           <a:lstStyle/>
           <a:p>
-            <a:pPr algn="ctr"/>
-            <a:r>
-              <a:rPr lang="en-GB" sz="7200" b="1" dirty="0">
-                <a:latin typeface="Arial" panose="020B0604020202020204" pitchFamily="34" charset="0"/>
-                <a:cs typeface="Arial" panose="020B0604020202020204" pitchFamily="34" charset="0"/>
+            <a:pPr algn="justLow"/>
+            <a:r>
+              <a:rPr lang="en-GB" sz="9600" b="1" dirty="0">
+                <a:latin typeface="Helvetica" panose="020B0604020202020204" pitchFamily="34" charset="0"/>
+                <a:cs typeface="Helvetica" panose="020B0604020202020204" pitchFamily="34" charset="0"/>
               </a:rPr>
               <a:t>Analysing UK SARS-CoV-2 spike protein mutations via t-SNE paired with K-means clustering</a:t>
             </a:r>
@@ -3475,7 +3845,7 @@
         </p:nvSpPr>
         <p:spPr>
           <a:xfrm>
-            <a:off x="0" y="4696026"/>
+            <a:off x="733156" y="4667443"/>
             <a:ext cx="6496646" cy="1015663"/>
           </a:xfrm>
           <a:prstGeom prst="rect">
@@ -3490,11 +3860,11 @@
           <a:lstStyle/>
           <a:p>
             <a:r>
-              <a:rPr lang="en-GB" sz="6000" dirty="0">
+              <a:rPr lang="en-GB" sz="6000" b="1" dirty="0">
                 <a:latin typeface="Arial" panose="020B0604020202020204" pitchFamily="34" charset="0"/>
                 <a:cs typeface="Arial" panose="020B0604020202020204" pitchFamily="34" charset="0"/>
               </a:rPr>
-              <a:t>Context and Aims</a:t>
+              <a:t>Context &amp; Aims</a:t>
             </a:r>
           </a:p>
         </p:txBody>
@@ -3513,7 +3883,7 @@
         </p:nvSpPr>
         <p:spPr>
           <a:xfrm>
-            <a:off x="9163076" y="4710315"/>
+            <a:off x="3329360" y="22410319"/>
             <a:ext cx="3598266" cy="1015663"/>
           </a:xfrm>
           <a:prstGeom prst="rect">
@@ -3528,7 +3898,7 @@
           <a:lstStyle/>
           <a:p>
             <a:r>
-              <a:rPr lang="en-GB" sz="6000" dirty="0">
+              <a:rPr lang="en-GB" sz="6000" b="1" dirty="0">
                 <a:latin typeface="Arial" panose="020B0604020202020204" pitchFamily="34" charset="0"/>
                 <a:cs typeface="Arial" panose="020B0604020202020204" pitchFamily="34" charset="0"/>
               </a:rPr>
@@ -3551,8 +3921,8 @@
         </p:nvSpPr>
         <p:spPr>
           <a:xfrm>
-            <a:off x="15713670" y="4710316"/>
-            <a:ext cx="4103390" cy="1015663"/>
+            <a:off x="12393281" y="4696025"/>
+            <a:ext cx="5004023" cy="1015663"/>
           </a:xfrm>
           <a:prstGeom prst="rect">
             <a:avLst/>
@@ -3566,49 +3936,11 @@
           <a:lstStyle/>
           <a:p>
             <a:r>
-              <a:rPr lang="en-GB" sz="6000" dirty="0">
+              <a:rPr lang="en-GB" sz="6000" b="1" dirty="0">
                 <a:latin typeface="Arial" panose="020B0604020202020204" pitchFamily="34" charset="0"/>
                 <a:cs typeface="Arial" panose="020B0604020202020204" pitchFamily="34" charset="0"/>
               </a:rPr>
               <a:t>Key results</a:t>
-            </a:r>
-          </a:p>
-        </p:txBody>
-      </p:sp>
-      <p:sp>
-        <p:nvSpPr>
-          <p:cNvPr id="8" name="TextBox 7">
-            <a:extLst>
-              <a:ext uri="{FF2B5EF4-FFF2-40B4-BE49-F238E27FC236}">
-                <a16:creationId xmlns:a16="http://schemas.microsoft.com/office/drawing/2014/main" id="{D12DF443-9E4C-0BE9-BC8C-B6BDFD5B16D6}"/>
-              </a:ext>
-            </a:extLst>
-          </p:cNvPr>
-          <p:cNvSpPr txBox="1"/>
-          <p:nvPr/>
-        </p:nvSpPr>
-        <p:spPr>
-          <a:xfrm>
-            <a:off x="24354629" y="4710315"/>
-            <a:ext cx="5920583" cy="1015663"/>
-          </a:xfrm>
-          <a:prstGeom prst="rect">
-            <a:avLst/>
-          </a:prstGeom>
-          <a:noFill/>
-        </p:spPr>
-        <p:txBody>
-          <a:bodyPr wrap="square" rtlCol="0">
-            <a:spAutoFit/>
-          </a:bodyPr>
-          <a:lstStyle/>
-          <a:p>
-            <a:r>
-              <a:rPr lang="en-GB" sz="6000" dirty="0">
-                <a:latin typeface="Arial" panose="020B0604020202020204" pitchFamily="34" charset="0"/>
-                <a:cs typeface="Arial" panose="020B0604020202020204" pitchFamily="34" charset="0"/>
-              </a:rPr>
-              <a:t>Conclusion</a:t>
             </a:r>
           </a:p>
         </p:txBody>
@@ -3627,7 +3959,7 @@
         </p:nvSpPr>
         <p:spPr>
           <a:xfrm>
-            <a:off x="24388492" y="17009393"/>
+            <a:off x="23264339" y="24303877"/>
             <a:ext cx="5920583" cy="1015663"/>
           </a:xfrm>
           <a:prstGeom prst="rect">
@@ -3642,7 +3974,7 @@
           <a:lstStyle/>
           <a:p>
             <a:r>
-              <a:rPr lang="en-GB" sz="6000" dirty="0">
+              <a:rPr lang="en-GB" sz="6000" b="1" dirty="0">
                 <a:latin typeface="Arial" panose="020B0604020202020204" pitchFamily="34" charset="0"/>
                 <a:cs typeface="Arial" panose="020B0604020202020204" pitchFamily="34" charset="0"/>
               </a:rPr>
@@ -3665,7 +3997,7 @@
         </p:nvSpPr>
         <p:spPr>
           <a:xfrm>
-            <a:off x="23346518" y="26802481"/>
+            <a:off x="17873910" y="11423104"/>
             <a:ext cx="6962557" cy="1938992"/>
           </a:xfrm>
           <a:prstGeom prst="rect">
@@ -3680,11 +4012,775 @@
           <a:lstStyle/>
           <a:p>
             <a:r>
-              <a:rPr lang="en-GB" sz="6000" dirty="0">
+              <a:rPr lang="en-GB" sz="6000" b="1" dirty="0">
                 <a:latin typeface="Arial" panose="020B0604020202020204" pitchFamily="34" charset="0"/>
                 <a:cs typeface="Arial" panose="020B0604020202020204" pitchFamily="34" charset="0"/>
               </a:rPr>
-              <a:t>Acknowledgments and References</a:t>
+              <a:t>Acknowledgments &amp; References</a:t>
+            </a:r>
+          </a:p>
+        </p:txBody>
+      </p:sp>
+      <p:sp>
+        <p:nvSpPr>
+          <p:cNvPr id="18" name="TextBox 17">
+            <a:extLst>
+              <a:ext uri="{FF2B5EF4-FFF2-40B4-BE49-F238E27FC236}">
+                <a16:creationId xmlns:a16="http://schemas.microsoft.com/office/drawing/2014/main" id="{6BFA8D6F-2973-0B7A-7367-A2E7DB16C973}"/>
+              </a:ext>
+            </a:extLst>
+          </p:cNvPr>
+          <p:cNvSpPr txBox="1"/>
+          <p:nvPr/>
+        </p:nvSpPr>
+        <p:spPr>
+          <a:xfrm>
+            <a:off x="375966" y="6610335"/>
+            <a:ext cx="5328592" cy="861774"/>
+          </a:xfrm>
+          <a:prstGeom prst="rect">
+            <a:avLst/>
+          </a:prstGeom>
+          <a:noFill/>
+        </p:spPr>
+        <p:txBody>
+          <a:bodyPr wrap="square" rtlCol="0">
+            <a:spAutoFit/>
+          </a:bodyPr>
+          <a:lstStyle/>
+          <a:p>
+            <a:r>
+              <a:rPr lang="en-GB" sz="5000" dirty="0">
+                <a:latin typeface="Arial" panose="020B0604020202020204" pitchFamily="34" charset="0"/>
+                <a:cs typeface="Arial" panose="020B0604020202020204" pitchFamily="34" charset="0"/>
+              </a:rPr>
+              <a:t>Statistics</a:t>
+            </a:r>
+          </a:p>
+        </p:txBody>
+      </p:sp>
+      <p:sp>
+        <p:nvSpPr>
+          <p:cNvPr id="21" name="TextBox 20">
+            <a:extLst>
+              <a:ext uri="{FF2B5EF4-FFF2-40B4-BE49-F238E27FC236}">
+                <a16:creationId xmlns:a16="http://schemas.microsoft.com/office/drawing/2014/main" id="{3F5EABF8-11F5-6CEA-6DE9-28FF64AE3804}"/>
+              </a:ext>
+            </a:extLst>
+          </p:cNvPr>
+          <p:cNvSpPr txBox="1"/>
+          <p:nvPr/>
+        </p:nvSpPr>
+        <p:spPr>
+          <a:xfrm>
+            <a:off x="24210501" y="4667444"/>
+            <a:ext cx="5004023" cy="1015663"/>
+          </a:xfrm>
+          <a:prstGeom prst="rect">
+            <a:avLst/>
+          </a:prstGeom>
+          <a:noFill/>
+        </p:spPr>
+        <p:txBody>
+          <a:bodyPr wrap="square" rtlCol="0">
+            <a:spAutoFit/>
+          </a:bodyPr>
+          <a:lstStyle/>
+          <a:p>
+            <a:r>
+              <a:rPr lang="en-GB" sz="6000" b="1" dirty="0">
+                <a:latin typeface="Arial" panose="020B0604020202020204" pitchFamily="34" charset="0"/>
+                <a:cs typeface="Arial" panose="020B0604020202020204" pitchFamily="34" charset="0"/>
+              </a:rPr>
+              <a:t>Conclusions</a:t>
+            </a:r>
+          </a:p>
+        </p:txBody>
+      </p:sp>
+      <p:sp>
+        <p:nvSpPr>
+          <p:cNvPr id="25" name="TextBox 24">
+            <a:extLst>
+              <a:ext uri="{FF2B5EF4-FFF2-40B4-BE49-F238E27FC236}">
+                <a16:creationId xmlns:a16="http://schemas.microsoft.com/office/drawing/2014/main" id="{ADB1CD0C-04F2-2D54-CD5E-45E27DF591AB}"/>
+              </a:ext>
+            </a:extLst>
+          </p:cNvPr>
+          <p:cNvSpPr txBox="1"/>
+          <p:nvPr/>
+        </p:nvSpPr>
+        <p:spPr>
+          <a:xfrm>
+            <a:off x="2464197" y="24294644"/>
+            <a:ext cx="5328592" cy="923330"/>
+          </a:xfrm>
+          <a:prstGeom prst="rect">
+            <a:avLst/>
+          </a:prstGeom>
+          <a:noFill/>
+        </p:spPr>
+        <p:txBody>
+          <a:bodyPr wrap="square" rtlCol="0">
+            <a:spAutoFit/>
+          </a:bodyPr>
+          <a:lstStyle/>
+          <a:p>
+            <a:r>
+              <a:rPr lang="en-GB" sz="5400" dirty="0">
+                <a:latin typeface="Arial" panose="020B0604020202020204" pitchFamily="34" charset="0"/>
+                <a:cs typeface="Arial" panose="020B0604020202020204" pitchFamily="34" charset="0"/>
+              </a:rPr>
+              <a:t>Data acquisition</a:t>
+            </a:r>
+          </a:p>
+        </p:txBody>
+      </p:sp>
+      <p:cxnSp>
+        <p:nvCxnSpPr>
+          <p:cNvPr id="33" name="Straight Arrow Connector 32">
+            <a:extLst>
+              <a:ext uri="{FF2B5EF4-FFF2-40B4-BE49-F238E27FC236}">
+                <a16:creationId xmlns:a16="http://schemas.microsoft.com/office/drawing/2014/main" id="{D3C79E24-4338-2ECF-9CD4-DE904FE4B9DC}"/>
+              </a:ext>
+            </a:extLst>
+          </p:cNvPr>
+          <p:cNvCxnSpPr>
+            <a:cxnSpLocks/>
+          </p:cNvCxnSpPr>
+          <p:nvPr/>
+        </p:nvCxnSpPr>
+        <p:spPr>
+          <a:xfrm>
+            <a:off x="4912470" y="25217974"/>
+            <a:ext cx="0" cy="2533054"/>
+          </a:xfrm>
+          <a:prstGeom prst="straightConnector1">
+            <a:avLst/>
+          </a:prstGeom>
+          <a:ln w="139700">
+            <a:tailEnd type="triangle"/>
+          </a:ln>
+        </p:spPr>
+        <p:style>
+          <a:lnRef idx="2">
+            <a:schemeClr val="accent1"/>
+          </a:lnRef>
+          <a:fillRef idx="0">
+            <a:schemeClr val="accent1"/>
+          </a:fillRef>
+          <a:effectRef idx="1">
+            <a:schemeClr val="accent1"/>
+          </a:effectRef>
+          <a:fontRef idx="minor">
+            <a:schemeClr val="tx1"/>
+          </a:fontRef>
+        </p:style>
+      </p:cxnSp>
+      <p:sp>
+        <p:nvSpPr>
+          <p:cNvPr id="37" name="TextBox 36">
+            <a:extLst>
+              <a:ext uri="{FF2B5EF4-FFF2-40B4-BE49-F238E27FC236}">
+                <a16:creationId xmlns:a16="http://schemas.microsoft.com/office/drawing/2014/main" id="{B3EC80CA-1AED-25AA-8603-9D7B098BFBF1}"/>
+              </a:ext>
+            </a:extLst>
+          </p:cNvPr>
+          <p:cNvSpPr txBox="1"/>
+          <p:nvPr/>
+        </p:nvSpPr>
+        <p:spPr>
+          <a:xfrm>
+            <a:off x="1240062" y="27691222"/>
+            <a:ext cx="7776862" cy="923330"/>
+          </a:xfrm>
+          <a:prstGeom prst="rect">
+            <a:avLst/>
+          </a:prstGeom>
+          <a:noFill/>
+        </p:spPr>
+        <p:txBody>
+          <a:bodyPr wrap="square" rtlCol="0">
+            <a:spAutoFit/>
+          </a:bodyPr>
+          <a:lstStyle/>
+          <a:p>
+            <a:r>
+              <a:rPr lang="en-GB" sz="5400" dirty="0">
+                <a:latin typeface="Arial" panose="020B0604020202020204" pitchFamily="34" charset="0"/>
+                <a:cs typeface="Arial" panose="020B0604020202020204" pitchFamily="34" charset="0"/>
+              </a:rPr>
+              <a:t>Dimensionality reduction</a:t>
+            </a:r>
+          </a:p>
+        </p:txBody>
+      </p:sp>
+      <p:cxnSp>
+        <p:nvCxnSpPr>
+          <p:cNvPr id="38" name="Straight Arrow Connector 37">
+            <a:extLst>
+              <a:ext uri="{FF2B5EF4-FFF2-40B4-BE49-F238E27FC236}">
+                <a16:creationId xmlns:a16="http://schemas.microsoft.com/office/drawing/2014/main" id="{C2F4A1F2-C034-A86B-E069-0269A2702FA4}"/>
+              </a:ext>
+            </a:extLst>
+          </p:cNvPr>
+          <p:cNvCxnSpPr>
+            <a:cxnSpLocks/>
+          </p:cNvCxnSpPr>
+          <p:nvPr/>
+        </p:nvCxnSpPr>
+        <p:spPr>
+          <a:xfrm flipH="1">
+            <a:off x="1941362" y="28689412"/>
+            <a:ext cx="1270093" cy="1636158"/>
+          </a:xfrm>
+          <a:prstGeom prst="straightConnector1">
+            <a:avLst/>
+          </a:prstGeom>
+          <a:ln w="139700">
+            <a:tailEnd type="triangle"/>
+          </a:ln>
+        </p:spPr>
+        <p:style>
+          <a:lnRef idx="2">
+            <a:schemeClr val="accent1"/>
+          </a:lnRef>
+          <a:fillRef idx="0">
+            <a:schemeClr val="accent1"/>
+          </a:fillRef>
+          <a:effectRef idx="1">
+            <a:schemeClr val="accent1"/>
+          </a:effectRef>
+          <a:fontRef idx="minor">
+            <a:schemeClr val="tx1"/>
+          </a:fontRef>
+        </p:style>
+      </p:cxnSp>
+      <p:cxnSp>
+        <p:nvCxnSpPr>
+          <p:cNvPr id="40" name="Straight Arrow Connector 39">
+            <a:extLst>
+              <a:ext uri="{FF2B5EF4-FFF2-40B4-BE49-F238E27FC236}">
+                <a16:creationId xmlns:a16="http://schemas.microsoft.com/office/drawing/2014/main" id="{704EFCE8-2678-1B68-83C9-12D0BDA4A7F2}"/>
+              </a:ext>
+            </a:extLst>
+          </p:cNvPr>
+          <p:cNvCxnSpPr>
+            <a:cxnSpLocks/>
+          </p:cNvCxnSpPr>
+          <p:nvPr/>
+        </p:nvCxnSpPr>
+        <p:spPr>
+          <a:xfrm>
+            <a:off x="4912470" y="28543116"/>
+            <a:ext cx="0" cy="2520280"/>
+          </a:xfrm>
+          <a:prstGeom prst="straightConnector1">
+            <a:avLst/>
+          </a:prstGeom>
+          <a:ln w="139700">
+            <a:tailEnd type="triangle"/>
+          </a:ln>
+        </p:spPr>
+        <p:style>
+          <a:lnRef idx="2">
+            <a:schemeClr val="accent1"/>
+          </a:lnRef>
+          <a:fillRef idx="0">
+            <a:schemeClr val="accent1"/>
+          </a:fillRef>
+          <a:effectRef idx="1">
+            <a:schemeClr val="accent1"/>
+          </a:effectRef>
+          <a:fontRef idx="minor">
+            <a:schemeClr val="tx1"/>
+          </a:fontRef>
+        </p:style>
+      </p:cxnSp>
+      <p:sp>
+        <p:nvSpPr>
+          <p:cNvPr id="48" name="TextBox 47">
+            <a:extLst>
+              <a:ext uri="{FF2B5EF4-FFF2-40B4-BE49-F238E27FC236}">
+                <a16:creationId xmlns:a16="http://schemas.microsoft.com/office/drawing/2014/main" id="{66FB707F-58FB-0524-C428-733BBAB0E15D}"/>
+              </a:ext>
+            </a:extLst>
+          </p:cNvPr>
+          <p:cNvSpPr txBox="1"/>
+          <p:nvPr/>
+        </p:nvSpPr>
+        <p:spPr>
+          <a:xfrm>
+            <a:off x="3904358" y="31087800"/>
+            <a:ext cx="3173462" cy="923330"/>
+          </a:xfrm>
+          <a:prstGeom prst="rect">
+            <a:avLst/>
+          </a:prstGeom>
+          <a:noFill/>
+        </p:spPr>
+        <p:txBody>
+          <a:bodyPr wrap="square" rtlCol="0">
+            <a:spAutoFit/>
+          </a:bodyPr>
+          <a:lstStyle/>
+          <a:p>
+            <a:r>
+              <a:rPr lang="en-GB" sz="5400" dirty="0">
+                <a:latin typeface="Arial" panose="020B0604020202020204" pitchFamily="34" charset="0"/>
+                <a:cs typeface="Arial" panose="020B0604020202020204" pitchFamily="34" charset="0"/>
+              </a:rPr>
+              <a:t>t-SNE</a:t>
+            </a:r>
+          </a:p>
+        </p:txBody>
+      </p:sp>
+      <p:sp>
+        <p:nvSpPr>
+          <p:cNvPr id="50" name="TextBox 49">
+            <a:extLst>
+              <a:ext uri="{FF2B5EF4-FFF2-40B4-BE49-F238E27FC236}">
+                <a16:creationId xmlns:a16="http://schemas.microsoft.com/office/drawing/2014/main" id="{61A9A262-822D-9023-50B6-1D9E6811B6C3}"/>
+              </a:ext>
+            </a:extLst>
+          </p:cNvPr>
+          <p:cNvSpPr txBox="1"/>
+          <p:nvPr/>
+        </p:nvSpPr>
+        <p:spPr>
+          <a:xfrm>
+            <a:off x="808017" y="30410352"/>
+            <a:ext cx="3173462" cy="923330"/>
+          </a:xfrm>
+          <a:prstGeom prst="rect">
+            <a:avLst/>
+          </a:prstGeom>
+          <a:noFill/>
+        </p:spPr>
+        <p:txBody>
+          <a:bodyPr wrap="square" rtlCol="0">
+            <a:spAutoFit/>
+          </a:bodyPr>
+          <a:lstStyle/>
+          <a:p>
+            <a:r>
+              <a:rPr lang="en-GB" sz="5400" dirty="0">
+                <a:latin typeface="Arial" panose="020B0604020202020204" pitchFamily="34" charset="0"/>
+                <a:cs typeface="Arial" panose="020B0604020202020204" pitchFamily="34" charset="0"/>
+              </a:rPr>
+              <a:t>PCA</a:t>
+            </a:r>
+          </a:p>
+        </p:txBody>
+      </p:sp>
+      <p:cxnSp>
+        <p:nvCxnSpPr>
+          <p:cNvPr id="51" name="Straight Arrow Connector 50">
+            <a:extLst>
+              <a:ext uri="{FF2B5EF4-FFF2-40B4-BE49-F238E27FC236}">
+                <a16:creationId xmlns:a16="http://schemas.microsoft.com/office/drawing/2014/main" id="{BD4A5CF2-4968-172E-9EE4-BF1A37ADAAB4}"/>
+              </a:ext>
+            </a:extLst>
+          </p:cNvPr>
+          <p:cNvCxnSpPr>
+            <a:cxnSpLocks/>
+          </p:cNvCxnSpPr>
+          <p:nvPr/>
+        </p:nvCxnSpPr>
+        <p:spPr>
+          <a:xfrm>
+            <a:off x="4957656" y="32011130"/>
+            <a:ext cx="0" cy="2520280"/>
+          </a:xfrm>
+          <a:prstGeom prst="straightConnector1">
+            <a:avLst/>
+          </a:prstGeom>
+          <a:ln w="139700">
+            <a:tailEnd type="triangle"/>
+          </a:ln>
+        </p:spPr>
+        <p:style>
+          <a:lnRef idx="2">
+            <a:schemeClr val="accent1"/>
+          </a:lnRef>
+          <a:fillRef idx="0">
+            <a:schemeClr val="accent1"/>
+          </a:fillRef>
+          <a:effectRef idx="1">
+            <a:schemeClr val="accent1"/>
+          </a:effectRef>
+          <a:fontRef idx="minor">
+            <a:schemeClr val="tx1"/>
+          </a:fontRef>
+        </p:style>
+      </p:cxnSp>
+      <p:sp>
+        <p:nvSpPr>
+          <p:cNvPr id="52" name="TextBox 51">
+            <a:extLst>
+              <a:ext uri="{FF2B5EF4-FFF2-40B4-BE49-F238E27FC236}">
+                <a16:creationId xmlns:a16="http://schemas.microsoft.com/office/drawing/2014/main" id="{73EA6F9E-09D4-5A25-D81F-78DC07F701BD}"/>
+              </a:ext>
+            </a:extLst>
+          </p:cNvPr>
+          <p:cNvSpPr txBox="1"/>
+          <p:nvPr/>
+        </p:nvSpPr>
+        <p:spPr>
+          <a:xfrm>
+            <a:off x="2559545" y="34531410"/>
+            <a:ext cx="5863087" cy="923330"/>
+          </a:xfrm>
+          <a:prstGeom prst="rect">
+            <a:avLst/>
+          </a:prstGeom>
+          <a:noFill/>
+        </p:spPr>
+        <p:txBody>
+          <a:bodyPr wrap="square" rtlCol="0">
+            <a:spAutoFit/>
+          </a:bodyPr>
+          <a:lstStyle/>
+          <a:p>
+            <a:r>
+              <a:rPr lang="en-GB" sz="5400" dirty="0">
+                <a:latin typeface="Arial" panose="020B0604020202020204" pitchFamily="34" charset="0"/>
+                <a:cs typeface="Arial" panose="020B0604020202020204" pitchFamily="34" charset="0"/>
+              </a:rPr>
+              <a:t>Cluster selection</a:t>
+            </a:r>
+          </a:p>
+        </p:txBody>
+      </p:sp>
+      <p:sp>
+        <p:nvSpPr>
+          <p:cNvPr id="53" name="TextBox 52">
+            <a:extLst>
+              <a:ext uri="{FF2B5EF4-FFF2-40B4-BE49-F238E27FC236}">
+                <a16:creationId xmlns:a16="http://schemas.microsoft.com/office/drawing/2014/main" id="{E28AE61A-D7CC-5CCC-A898-CBC3BB5B6361}"/>
+              </a:ext>
+            </a:extLst>
+          </p:cNvPr>
+          <p:cNvSpPr txBox="1"/>
+          <p:nvPr/>
+        </p:nvSpPr>
+        <p:spPr>
+          <a:xfrm>
+            <a:off x="2611507" y="37844922"/>
+            <a:ext cx="5863087" cy="923330"/>
+          </a:xfrm>
+          <a:prstGeom prst="rect">
+            <a:avLst/>
+          </a:prstGeom>
+          <a:noFill/>
+        </p:spPr>
+        <p:txBody>
+          <a:bodyPr wrap="square" rtlCol="0">
+            <a:spAutoFit/>
+          </a:bodyPr>
+          <a:lstStyle/>
+          <a:p>
+            <a:r>
+              <a:rPr lang="en-GB" sz="5400" dirty="0">
+                <a:latin typeface="Arial" panose="020B0604020202020204" pitchFamily="34" charset="0"/>
+                <a:cs typeface="Arial" panose="020B0604020202020204" pitchFamily="34" charset="0"/>
+              </a:rPr>
+              <a:t>Mutation profiling</a:t>
+            </a:r>
+          </a:p>
+        </p:txBody>
+      </p:sp>
+      <p:cxnSp>
+        <p:nvCxnSpPr>
+          <p:cNvPr id="54" name="Straight Arrow Connector 53">
+            <a:extLst>
+              <a:ext uri="{FF2B5EF4-FFF2-40B4-BE49-F238E27FC236}">
+                <a16:creationId xmlns:a16="http://schemas.microsoft.com/office/drawing/2014/main" id="{7CCC2150-B004-0A72-74F6-553C20C1789A}"/>
+              </a:ext>
+            </a:extLst>
+          </p:cNvPr>
+          <p:cNvCxnSpPr>
+            <a:cxnSpLocks/>
+          </p:cNvCxnSpPr>
+          <p:nvPr/>
+        </p:nvCxnSpPr>
+        <p:spPr>
+          <a:xfrm>
+            <a:off x="4957656" y="35239860"/>
+            <a:ext cx="0" cy="2520280"/>
+          </a:xfrm>
+          <a:prstGeom prst="straightConnector1">
+            <a:avLst/>
+          </a:prstGeom>
+          <a:ln w="139700">
+            <a:tailEnd type="triangle"/>
+          </a:ln>
+        </p:spPr>
+        <p:style>
+          <a:lnRef idx="2">
+            <a:schemeClr val="accent1"/>
+          </a:lnRef>
+          <a:fillRef idx="0">
+            <a:schemeClr val="accent1"/>
+          </a:fillRef>
+          <a:effectRef idx="1">
+            <a:schemeClr val="accent1"/>
+          </a:effectRef>
+          <a:fontRef idx="minor">
+            <a:schemeClr val="tx1"/>
+          </a:fontRef>
+        </p:style>
+      </p:cxnSp>
+      <p:cxnSp>
+        <p:nvCxnSpPr>
+          <p:cNvPr id="56" name="Straight Arrow Connector 55">
+            <a:extLst>
+              <a:ext uri="{FF2B5EF4-FFF2-40B4-BE49-F238E27FC236}">
+                <a16:creationId xmlns:a16="http://schemas.microsoft.com/office/drawing/2014/main" id="{7C3BAE51-CF8D-B7E5-9BAC-356101471CB3}"/>
+              </a:ext>
+            </a:extLst>
+          </p:cNvPr>
+          <p:cNvCxnSpPr>
+            <a:cxnSpLocks/>
+          </p:cNvCxnSpPr>
+          <p:nvPr/>
+        </p:nvCxnSpPr>
+        <p:spPr>
+          <a:xfrm>
+            <a:off x="4950159" y="38624236"/>
+            <a:ext cx="0" cy="2520280"/>
+          </a:xfrm>
+          <a:prstGeom prst="straightConnector1">
+            <a:avLst/>
+          </a:prstGeom>
+          <a:ln w="139700">
+            <a:tailEnd type="triangle"/>
+          </a:ln>
+        </p:spPr>
+        <p:style>
+          <a:lnRef idx="2">
+            <a:schemeClr val="accent1"/>
+          </a:lnRef>
+          <a:fillRef idx="0">
+            <a:schemeClr val="accent1"/>
+          </a:fillRef>
+          <a:effectRef idx="1">
+            <a:schemeClr val="accent1"/>
+          </a:effectRef>
+          <a:fontRef idx="minor">
+            <a:schemeClr val="tx1"/>
+          </a:fontRef>
+        </p:style>
+      </p:cxnSp>
+      <p:sp>
+        <p:nvSpPr>
+          <p:cNvPr id="57" name="TextBox 56">
+            <a:extLst>
+              <a:ext uri="{FF2B5EF4-FFF2-40B4-BE49-F238E27FC236}">
+                <a16:creationId xmlns:a16="http://schemas.microsoft.com/office/drawing/2014/main" id="{ACB41813-D9CB-C70A-69F0-42AA552540E8}"/>
+              </a:ext>
+            </a:extLst>
+          </p:cNvPr>
+          <p:cNvSpPr txBox="1"/>
+          <p:nvPr/>
+        </p:nvSpPr>
+        <p:spPr>
+          <a:xfrm>
+            <a:off x="2248176" y="41280467"/>
+            <a:ext cx="6768748" cy="923330"/>
+          </a:xfrm>
+          <a:prstGeom prst="rect">
+            <a:avLst/>
+          </a:prstGeom>
+          <a:noFill/>
+        </p:spPr>
+        <p:txBody>
+          <a:bodyPr wrap="square" rtlCol="0">
+            <a:spAutoFit/>
+          </a:bodyPr>
+          <a:lstStyle/>
+          <a:p>
+            <a:r>
+              <a:rPr lang="en-GB" sz="5400" dirty="0">
+                <a:latin typeface="Arial" panose="020B0604020202020204" pitchFamily="34" charset="0"/>
+                <a:ea typeface="Source Sans Pro" panose="020B0503030403020204" pitchFamily="34" charset="0"/>
+                <a:cs typeface="Arial" panose="020B0604020202020204" pitchFamily="34" charset="0"/>
+              </a:rPr>
+              <a:t>Lineage assignment</a:t>
+            </a:r>
+          </a:p>
+        </p:txBody>
+      </p:sp>
+      <p:sp>
+        <p:nvSpPr>
+          <p:cNvPr id="1031" name="Arrow: Bent 1030">
+            <a:extLst>
+              <a:ext uri="{FF2B5EF4-FFF2-40B4-BE49-F238E27FC236}">
+                <a16:creationId xmlns:a16="http://schemas.microsoft.com/office/drawing/2014/main" id="{7C9DCCCE-FBC3-236D-A813-30BBE9BD287A}"/>
+              </a:ext>
+            </a:extLst>
+          </p:cNvPr>
+          <p:cNvSpPr/>
+          <p:nvPr/>
+        </p:nvSpPr>
+        <p:spPr>
+          <a:xfrm>
+            <a:off x="4843022" y="26226417"/>
+            <a:ext cx="1296131" cy="471431"/>
+          </a:xfrm>
+          <a:prstGeom prst="bentArrow">
+            <a:avLst>
+              <a:gd name="adj1" fmla="val 25000"/>
+              <a:gd name="adj2" fmla="val 39843"/>
+              <a:gd name="adj3" fmla="val 32190"/>
+              <a:gd name="adj4" fmla="val 24247"/>
+            </a:avLst>
+          </a:prstGeom>
+          <a:ln>
+            <a:noFill/>
+          </a:ln>
+        </p:spPr>
+        <p:style>
+          <a:lnRef idx="2">
+            <a:schemeClr val="accent1">
+              <a:shade val="15000"/>
+            </a:schemeClr>
+          </a:lnRef>
+          <a:fillRef idx="1">
+            <a:schemeClr val="accent1"/>
+          </a:fillRef>
+          <a:effectRef idx="0">
+            <a:schemeClr val="accent1"/>
+          </a:effectRef>
+          <a:fontRef idx="minor">
+            <a:schemeClr val="lt1"/>
+          </a:fontRef>
+        </p:style>
+        <p:txBody>
+          <a:bodyPr rtlCol="0" anchor="ctr"/>
+          <a:lstStyle/>
+          <a:p>
+            <a:pPr algn="ctr"/>
+            <a:endParaRPr lang="en-GB" dirty="0">
+              <a:solidFill>
+                <a:schemeClr val="tx1"/>
+              </a:solidFill>
+            </a:endParaRPr>
+          </a:p>
+        </p:txBody>
+      </p:sp>
+      <p:sp>
+        <p:nvSpPr>
+          <p:cNvPr id="1032" name="TextBox 1031">
+            <a:extLst>
+              <a:ext uri="{FF2B5EF4-FFF2-40B4-BE49-F238E27FC236}">
+                <a16:creationId xmlns:a16="http://schemas.microsoft.com/office/drawing/2014/main" id="{74943ED8-77B4-AD87-4BED-DA8C1A4ADC0A}"/>
+              </a:ext>
+            </a:extLst>
+          </p:cNvPr>
+          <p:cNvSpPr txBox="1"/>
+          <p:nvPr/>
+        </p:nvSpPr>
+        <p:spPr>
+          <a:xfrm>
+            <a:off x="6213981" y="25585844"/>
+            <a:ext cx="5328592" cy="1569660"/>
+          </a:xfrm>
+          <a:prstGeom prst="rect">
+            <a:avLst/>
+          </a:prstGeom>
+          <a:noFill/>
+        </p:spPr>
+        <p:txBody>
+          <a:bodyPr wrap="square" rtlCol="0">
+            <a:spAutoFit/>
+          </a:bodyPr>
+          <a:lstStyle/>
+          <a:p>
+            <a:r>
+              <a:rPr lang="en-GB" sz="4800" dirty="0">
+                <a:latin typeface="Arial" panose="020B0604020202020204" pitchFamily="34" charset="0"/>
+                <a:cs typeface="Arial" panose="020B0604020202020204" pitchFamily="34" charset="0"/>
+              </a:rPr>
+              <a:t>Temporal and general trends</a:t>
+            </a:r>
+          </a:p>
+        </p:txBody>
+      </p:sp>
+      <p:cxnSp>
+        <p:nvCxnSpPr>
+          <p:cNvPr id="42" name="Straight Arrow Connector 41">
+            <a:extLst>
+              <a:ext uri="{FF2B5EF4-FFF2-40B4-BE49-F238E27FC236}">
+                <a16:creationId xmlns:a16="http://schemas.microsoft.com/office/drawing/2014/main" id="{2431291A-133B-FC9B-8D53-6916BE0073C9}"/>
+              </a:ext>
+            </a:extLst>
+          </p:cNvPr>
+          <p:cNvCxnSpPr>
+            <a:cxnSpLocks/>
+          </p:cNvCxnSpPr>
+          <p:nvPr/>
+        </p:nvCxnSpPr>
+        <p:spPr>
+          <a:xfrm>
+            <a:off x="7504758" y="28689412"/>
+            <a:ext cx="1080121" cy="1636158"/>
+          </a:xfrm>
+          <a:prstGeom prst="straightConnector1">
+            <a:avLst/>
+          </a:prstGeom>
+          <a:ln w="139700">
+            <a:tailEnd type="triangle"/>
+          </a:ln>
+        </p:spPr>
+        <p:style>
+          <a:lnRef idx="2">
+            <a:schemeClr val="accent1"/>
+          </a:lnRef>
+          <a:fillRef idx="0">
+            <a:schemeClr val="accent1"/>
+          </a:fillRef>
+          <a:effectRef idx="1">
+            <a:schemeClr val="accent1"/>
+          </a:effectRef>
+          <a:fontRef idx="minor">
+            <a:schemeClr val="tx1"/>
+          </a:fontRef>
+        </p:style>
+      </p:cxnSp>
+      <p:sp>
+        <p:nvSpPr>
+          <p:cNvPr id="49" name="TextBox 48">
+            <a:extLst>
+              <a:ext uri="{FF2B5EF4-FFF2-40B4-BE49-F238E27FC236}">
+                <a16:creationId xmlns:a16="http://schemas.microsoft.com/office/drawing/2014/main" id="{0872C768-8D38-1919-9E2E-CCAF17AD9A3B}"/>
+              </a:ext>
+            </a:extLst>
+          </p:cNvPr>
+          <p:cNvSpPr txBox="1"/>
+          <p:nvPr/>
+        </p:nvSpPr>
+        <p:spPr>
+          <a:xfrm>
+            <a:off x="7576766" y="30400430"/>
+            <a:ext cx="3173462" cy="923330"/>
+          </a:xfrm>
+          <a:prstGeom prst="rect">
+            <a:avLst/>
+          </a:prstGeom>
+          <a:noFill/>
+        </p:spPr>
+        <p:txBody>
+          <a:bodyPr wrap="square" rtlCol="0">
+            <a:spAutoFit/>
+          </a:bodyPr>
+          <a:lstStyle/>
+          <a:p>
+            <a:r>
+              <a:rPr lang="en-GB" sz="5400" dirty="0">
+                <a:latin typeface="Arial" panose="020B0604020202020204" pitchFamily="34" charset="0"/>
+                <a:cs typeface="Arial" panose="020B0604020202020204" pitchFamily="34" charset="0"/>
+              </a:rPr>
+              <a:t>UMAP</a:t>
             </a:r>
           </a:p>
         </p:txBody>

</xml_diff>